<commit_message>
Adding third dashboard design page
</commit_message>
<xml_diff>
--- a/dasboard/design/app-backgrounds.pptx
+++ b/dasboard/design/app-backgrounds.pptx
@@ -10,26 +10,22 @@
   <p:sldIdLst>
     <p:sldId id="285" r:id="rId2"/>
     <p:sldId id="290" r:id="rId3"/>
-    <p:sldId id="291" r:id="rId4"/>
+    <p:sldId id="292" r:id="rId4"/>
   </p:sldIdLst>
   <p:sldSz cx="18288000" cy="10287000"/>
   <p:notesSz cx="6858000" cy="9144000"/>
   <p:embeddedFontLst>
     <p:embeddedFont>
-      <p:font typeface="Calibri" panose="020F0502020204030204" pitchFamily="34" charset="0"/>
+      <p:font typeface="Open Sans Light" panose="020B0306030504020204" pitchFamily="34" charset="0"/>
       <p:regular r:id="rId6"/>
-      <p:bold r:id="rId7"/>
-      <p:italic r:id="rId8"/>
-      <p:boldItalic r:id="rId9"/>
+      <p:italic r:id="rId7"/>
     </p:embeddedFont>
     <p:embeddedFont>
-      <p:font typeface="Open Sans Light" pitchFamily="2" charset="0"/>
-      <p:regular r:id="rId10"/>
-    </p:embeddedFont>
-    <p:embeddedFont>
-      <p:font typeface="Open Sans SemiBold" pitchFamily="2" charset="0"/>
-      <p:regular r:id="rId11"/>
-      <p:bold r:id="rId12"/>
+      <p:font typeface="Open Sans SemiBold" panose="020B0606030504020204" pitchFamily="34" charset="0"/>
+      <p:regular r:id="rId8"/>
+      <p:bold r:id="rId9"/>
+      <p:italic r:id="rId10"/>
+      <p:boldItalic r:id="rId11"/>
     </p:embeddedFont>
   </p:embeddedFontLst>
   <p:defaultTextStyle>
@@ -737,7 +733,7 @@
     </p:spTree>
     <p:extLst>
       <p:ext uri="{BB962C8B-B14F-4D97-AF65-F5344CB8AC3E}">
-        <p14:creationId xmlns:p14="http://schemas.microsoft.com/office/powerpoint/2010/main" val="657783400"/>
+        <p14:creationId xmlns:p14="http://schemas.microsoft.com/office/powerpoint/2010/main" val="1579505338"/>
       </p:ext>
     </p:extLst>
   </p:cSld>
@@ -6053,75 +6049,12 @@
         </p:nvGrpSpPr>
         <p:grpSpPr>
           <a:xfrm>
-            <a:off x="2990999" y="1757690"/>
-            <a:ext cx="14923578" cy="8076842"/>
-            <a:chOff x="2990999" y="1757690"/>
-            <a:chExt cx="14923578" cy="8076842"/>
+            <a:off x="3136570" y="1511885"/>
+            <a:ext cx="14863687" cy="8322647"/>
+            <a:chOff x="3136570" y="1511885"/>
+            <a:chExt cx="14863687" cy="8322647"/>
           </a:xfrm>
         </p:grpSpPr>
-        <p:sp>
-          <p:nvSpPr>
-            <p:cNvPr id="12" name="Prostokąt zaokrąglony 11">
-              <a:extLst>
-                <a:ext uri="{FF2B5EF4-FFF2-40B4-BE49-F238E27FC236}">
-                  <a16:creationId xmlns:a16="http://schemas.microsoft.com/office/drawing/2014/main" id="{080BDDC7-5E65-EE43-0CFC-C822FC44CB81}"/>
-                </a:ext>
-              </a:extLst>
-            </p:cNvPr>
-            <p:cNvSpPr/>
-            <p:nvPr/>
-          </p:nvSpPr>
-          <p:spPr>
-            <a:xfrm>
-              <a:off x="12812517" y="5100102"/>
-              <a:ext cx="5102060" cy="4733455"/>
-            </a:xfrm>
-            <a:prstGeom prst="roundRect">
-              <a:avLst>
-                <a:gd name="adj" fmla="val 3467"/>
-              </a:avLst>
-            </a:prstGeom>
-            <a:solidFill>
-              <a:srgbClr val="0C032A">
-                <a:alpha val="66000"/>
-              </a:srgbClr>
-            </a:solidFill>
-            <a:ln>
-              <a:noFill/>
-            </a:ln>
-            <a:effectLst>
-              <a:outerShdw blurRad="462104" dist="38100" dir="7800000" sx="101623" sy="101623" algn="tl" rotWithShape="0">
-                <a:schemeClr val="bg1">
-                  <a:alpha val="84069"/>
-                </a:schemeClr>
-              </a:outerShdw>
-            </a:effectLst>
-          </p:spPr>
-          <p:style>
-            <a:lnRef idx="2">
-              <a:schemeClr val="accent1">
-                <a:shade val="15000"/>
-              </a:schemeClr>
-            </a:lnRef>
-            <a:fillRef idx="1">
-              <a:schemeClr val="accent1"/>
-            </a:fillRef>
-            <a:effectRef idx="0">
-              <a:schemeClr val="accent1"/>
-            </a:effectRef>
-            <a:fontRef idx="minor">
-              <a:schemeClr val="lt1"/>
-            </a:fontRef>
-          </p:style>
-          <p:txBody>
-            <a:bodyPr rtlCol="0" anchor="ctr"/>
-            <a:lstStyle/>
-            <a:p>
-              <a:pPr algn="ctr"/>
-              <a:endParaRPr lang="pl-PL" sz="2700" dirty="0"/>
-            </a:p>
-          </p:txBody>
-        </p:sp>
         <p:sp>
           <p:nvSpPr>
             <p:cNvPr id="15" name="Prostokąt zaokrąglony 14">
@@ -6136,8 +6069,8 @@
           </p:nvSpPr>
           <p:spPr>
             <a:xfrm>
-              <a:off x="2990999" y="5143499"/>
-              <a:ext cx="8777053" cy="4691033"/>
+              <a:off x="3147954" y="5638140"/>
+              <a:ext cx="14852302" cy="4196392"/>
             </a:xfrm>
             <a:prstGeom prst="roundRect">
               <a:avLst>
@@ -6199,8 +6132,8 @@
           </p:nvSpPr>
           <p:spPr>
             <a:xfrm>
-              <a:off x="2990999" y="1757691"/>
-              <a:ext cx="2800201" cy="2539992"/>
+              <a:off x="3136570" y="1511885"/>
+              <a:ext cx="1614607" cy="3353941"/>
             </a:xfrm>
             <a:prstGeom prst="roundRect">
               <a:avLst>
@@ -6262,8 +6195,8 @@
           </p:nvSpPr>
           <p:spPr>
             <a:xfrm>
-              <a:off x="12790001" y="1757690"/>
-              <a:ext cx="5102059" cy="2547610"/>
+              <a:off x="12541595" y="1534071"/>
+              <a:ext cx="5458662" cy="3331756"/>
             </a:xfrm>
             <a:prstGeom prst="roundRect">
               <a:avLst>
@@ -6325,8 +6258,8 @@
           </p:nvSpPr>
           <p:spPr>
             <a:xfrm>
-              <a:off x="6809203" y="1765309"/>
-              <a:ext cx="4958850" cy="2519165"/>
+              <a:off x="5298697" y="1515689"/>
+              <a:ext cx="2892588" cy="1492733"/>
             </a:xfrm>
             <a:prstGeom prst="roundRect">
               <a:avLst>
@@ -6375,57 +6308,6 @@
           </p:txBody>
         </p:sp>
       </p:grpSp>
-      <p:sp>
-        <p:nvSpPr>
-          <p:cNvPr id="2" name="TextBox 4">
-            <a:extLst>
-              <a:ext uri="{FF2B5EF4-FFF2-40B4-BE49-F238E27FC236}">
-                <a16:creationId xmlns:a16="http://schemas.microsoft.com/office/drawing/2014/main" id="{BA24CA0F-54F5-6E84-7E25-D45346CCA2B7}"/>
-              </a:ext>
-            </a:extLst>
-          </p:cNvPr>
-          <p:cNvSpPr txBox="1"/>
-          <p:nvPr/>
-        </p:nvSpPr>
-        <p:spPr>
-          <a:xfrm>
-            <a:off x="1712956" y="4042607"/>
-            <a:ext cx="8648700" cy="846386"/>
-          </a:xfrm>
-          <a:prstGeom prst="rect">
-            <a:avLst/>
-          </a:prstGeom>
-        </p:spPr>
-        <p:txBody>
-          <a:bodyPr wrap="square" lIns="0" tIns="0" rIns="0" bIns="0" rtlCol="0" anchor="t">
-            <a:spAutoFit/>
-          </a:bodyPr>
-          <a:lstStyle>
-            <a:defPPr>
-              <a:defRPr lang="en-US"/>
-            </a:defPPr>
-            <a:lvl1pPr>
-              <a:lnSpc>
-                <a:spcPts val="6599"/>
-              </a:lnSpc>
-              <a:defRPr sz="6000" b="1">
-                <a:solidFill>
-                  <a:srgbClr val="F8F8F8"/>
-                </a:solidFill>
-                <a:latin typeface="Open Sans Light" pitchFamily="2" charset="0"/>
-                <a:ea typeface="Open Sans Light" pitchFamily="2" charset="0"/>
-                <a:cs typeface="Open Sans Light" pitchFamily="2" charset="0"/>
-              </a:defRPr>
-            </a:lvl1pPr>
-          </a:lstStyle>
-          <a:p>
-            <a:r>
-              <a:rPr lang="en-US" dirty="0"/>
-              <a:t> </a:t>
-            </a:r>
-          </a:p>
-        </p:txBody>
-      </p:sp>
       <p:sp>
         <p:nvSpPr>
           <p:cNvPr id="6" name="Prostokąt 5">
@@ -6649,184 +6531,6 @@
           </a:p>
         </p:txBody>
       </p:sp>
-      <p:cxnSp>
-        <p:nvCxnSpPr>
-          <p:cNvPr id="57" name="Łącznik prosty 56">
-            <a:extLst>
-              <a:ext uri="{FF2B5EF4-FFF2-40B4-BE49-F238E27FC236}">
-                <a16:creationId xmlns:a16="http://schemas.microsoft.com/office/drawing/2014/main" id="{A26C7455-75DA-3491-5EFB-505AC33D49C0}"/>
-              </a:ext>
-            </a:extLst>
-          </p:cNvPr>
-          <p:cNvCxnSpPr>
-            <a:cxnSpLocks/>
-          </p:cNvCxnSpPr>
-          <p:nvPr/>
-        </p:nvCxnSpPr>
-        <p:spPr>
-          <a:xfrm>
-            <a:off x="229448" y="5101079"/>
-            <a:ext cx="1971426" cy="0"/>
-          </a:xfrm>
-          <a:prstGeom prst="line">
-            <a:avLst/>
-          </a:prstGeom>
-          <a:ln>
-            <a:solidFill>
-              <a:schemeClr val="bg1"/>
-            </a:solidFill>
-          </a:ln>
-        </p:spPr>
-        <p:style>
-          <a:lnRef idx="1">
-            <a:schemeClr val="accent1"/>
-          </a:lnRef>
-          <a:fillRef idx="0">
-            <a:schemeClr val="accent1"/>
-          </a:fillRef>
-          <a:effectRef idx="0">
-            <a:schemeClr val="accent1"/>
-          </a:effectRef>
-          <a:fontRef idx="minor">
-            <a:schemeClr val="tx1"/>
-          </a:fontRef>
-        </p:style>
-      </p:cxnSp>
-      <p:cxnSp>
-        <p:nvCxnSpPr>
-          <p:cNvPr id="58" name="Łącznik prosty 57">
-            <a:extLst>
-              <a:ext uri="{FF2B5EF4-FFF2-40B4-BE49-F238E27FC236}">
-                <a16:creationId xmlns:a16="http://schemas.microsoft.com/office/drawing/2014/main" id="{6BFEDB54-7556-086A-033A-D368B94E3953}"/>
-              </a:ext>
-            </a:extLst>
-          </p:cNvPr>
-          <p:cNvCxnSpPr>
-            <a:cxnSpLocks/>
-          </p:cNvCxnSpPr>
-          <p:nvPr/>
-        </p:nvCxnSpPr>
-        <p:spPr>
-          <a:xfrm>
-            <a:off x="238367" y="3238500"/>
-            <a:ext cx="1971425" cy="0"/>
-          </a:xfrm>
-          <a:prstGeom prst="line">
-            <a:avLst/>
-          </a:prstGeom>
-          <a:ln>
-            <a:solidFill>
-              <a:schemeClr val="bg1"/>
-            </a:solidFill>
-          </a:ln>
-        </p:spPr>
-        <p:style>
-          <a:lnRef idx="1">
-            <a:schemeClr val="accent1"/>
-          </a:lnRef>
-          <a:fillRef idx="0">
-            <a:schemeClr val="accent1"/>
-          </a:fillRef>
-          <a:effectRef idx="0">
-            <a:schemeClr val="accent1"/>
-          </a:effectRef>
-          <a:fontRef idx="minor">
-            <a:schemeClr val="tx1"/>
-          </a:fontRef>
-        </p:style>
-      </p:cxnSp>
-      <p:sp>
-        <p:nvSpPr>
-          <p:cNvPr id="62" name="pole tekstowe 61">
-            <a:extLst>
-              <a:ext uri="{FF2B5EF4-FFF2-40B4-BE49-F238E27FC236}">
-                <a16:creationId xmlns:a16="http://schemas.microsoft.com/office/drawing/2014/main" id="{F9EE8CD6-49C8-A912-CCBC-F5CB5E6BCBF8}"/>
-              </a:ext>
-            </a:extLst>
-          </p:cNvPr>
-          <p:cNvSpPr txBox="1"/>
-          <p:nvPr/>
-        </p:nvSpPr>
-        <p:spPr>
-          <a:xfrm>
-            <a:off x="142329" y="2795686"/>
-            <a:ext cx="2449637" cy="369332"/>
-          </a:xfrm>
-          <a:prstGeom prst="rect">
-            <a:avLst/>
-          </a:prstGeom>
-          <a:noFill/>
-        </p:spPr>
-        <p:txBody>
-          <a:bodyPr wrap="square">
-            <a:spAutoFit/>
-          </a:bodyPr>
-          <a:lstStyle/>
-          <a:p>
-            <a:r>
-              <a:rPr lang="pl-PL" spc="450" dirty="0">
-                <a:solidFill>
-                  <a:schemeClr val="bg1"/>
-                </a:solidFill>
-                <a:latin typeface="Open Sans Light" panose="020B0606030504020204" pitchFamily="34" charset="0"/>
-                <a:ea typeface="Open Sans Light" panose="020B0606030504020204" pitchFamily="34" charset="0"/>
-                <a:cs typeface="Open Sans Light" panose="020B0606030504020204" pitchFamily="34" charset="0"/>
-              </a:rPr>
-              <a:t>DEPARTMENTS</a:t>
-            </a:r>
-          </a:p>
-        </p:txBody>
-      </p:sp>
-      <p:sp>
-        <p:nvSpPr>
-          <p:cNvPr id="64" name="pole tekstowe 63">
-            <a:extLst>
-              <a:ext uri="{FF2B5EF4-FFF2-40B4-BE49-F238E27FC236}">
-                <a16:creationId xmlns:a16="http://schemas.microsoft.com/office/drawing/2014/main" id="{90C048ED-7C91-5F43-093B-9D47C9BC0A9D}"/>
-              </a:ext>
-            </a:extLst>
-          </p:cNvPr>
-          <p:cNvSpPr txBox="1"/>
-          <p:nvPr/>
-        </p:nvSpPr>
-        <p:spPr>
-          <a:xfrm>
-            <a:off x="143128" y="4636662"/>
-            <a:ext cx="1566040" cy="369332"/>
-          </a:xfrm>
-          <a:prstGeom prst="rect">
-            <a:avLst/>
-          </a:prstGeom>
-          <a:noFill/>
-        </p:spPr>
-        <p:txBody>
-          <a:bodyPr wrap="square">
-            <a:spAutoFit/>
-          </a:bodyPr>
-          <a:lstStyle/>
-          <a:p>
-            <a:r>
-              <a:rPr lang="pl-PL" spc="450" dirty="0">
-                <a:solidFill>
-                  <a:schemeClr val="bg1"/>
-                </a:solidFill>
-                <a:latin typeface="Open Sans Light" panose="020B0606030504020204" pitchFamily="34" charset="0"/>
-                <a:ea typeface="Open Sans Light" panose="020B0606030504020204" pitchFamily="34" charset="0"/>
-                <a:cs typeface="Open Sans Light" panose="020B0606030504020204" pitchFamily="34" charset="0"/>
-              </a:rPr>
-              <a:t>TEAMS</a:t>
-            </a:r>
-            <a:endParaRPr lang="pl-PL" sz="1800" spc="450" dirty="0">
-              <a:solidFill>
-                <a:schemeClr val="bg1"/>
-              </a:solidFill>
-              <a:latin typeface="Open Sans Light" panose="020B0606030504020204" pitchFamily="34" charset="0"/>
-              <a:ea typeface="Open Sans Light" panose="020B0606030504020204" pitchFamily="34" charset="0"/>
-              <a:cs typeface="Open Sans Light" panose="020B0606030504020204" pitchFamily="34" charset="0"/>
-            </a:endParaRPr>
-          </a:p>
-        </p:txBody>
-      </p:sp>
       <p:grpSp>
         <p:nvGrpSpPr>
           <p:cNvPr id="11" name="Grupa 10">
@@ -6841,10 +6545,10 @@
         </p:nvGrpSpPr>
         <p:grpSpPr>
           <a:xfrm>
-            <a:off x="2990999" y="1756716"/>
-            <a:ext cx="14901063" cy="8076842"/>
-            <a:chOff x="2990999" y="1756716"/>
-            <a:chExt cx="14901063" cy="8076842"/>
+            <a:off x="3147954" y="1511883"/>
+            <a:ext cx="14852302" cy="8322650"/>
+            <a:chOff x="2673859" y="1487973"/>
+            <a:chExt cx="14852302" cy="8322650"/>
           </a:xfrm>
         </p:grpSpPr>
         <p:sp>
@@ -6861,8 +6565,8 @@
           </p:nvSpPr>
           <p:spPr>
             <a:xfrm>
-              <a:off x="12790000" y="1778518"/>
-              <a:ext cx="5102060" cy="2519165"/>
+              <a:off x="12067500" y="1510158"/>
+              <a:ext cx="5458661" cy="3331756"/>
             </a:xfrm>
             <a:prstGeom prst="roundRect">
               <a:avLst>
@@ -6918,8 +6622,8 @@
           </p:nvSpPr>
           <p:spPr>
             <a:xfrm>
-              <a:off x="2990999" y="5081227"/>
-              <a:ext cx="8777053" cy="4752331"/>
+              <a:off x="2673859" y="5614230"/>
+              <a:ext cx="14852302" cy="4196393"/>
             </a:xfrm>
             <a:prstGeom prst="roundRect">
               <a:avLst>
@@ -6929,120 +6633,6 @@
             <a:solidFill>
               <a:srgbClr val="0C032A">
                 <a:alpha val="91024"/>
-              </a:srgbClr>
-            </a:solidFill>
-            <a:ln>
-              <a:noFill/>
-            </a:ln>
-            <a:effectLst/>
-          </p:spPr>
-          <p:style>
-            <a:lnRef idx="2">
-              <a:schemeClr val="accent1">
-                <a:shade val="15000"/>
-              </a:schemeClr>
-            </a:lnRef>
-            <a:fillRef idx="1">
-              <a:schemeClr val="accent1"/>
-            </a:fillRef>
-            <a:effectRef idx="0">
-              <a:schemeClr val="accent1"/>
-            </a:effectRef>
-            <a:fontRef idx="minor">
-              <a:schemeClr val="lt1"/>
-            </a:fontRef>
-          </p:style>
-          <p:txBody>
-            <a:bodyPr rtlCol="0" anchor="ctr"/>
-            <a:lstStyle/>
-            <a:p>
-              <a:pPr algn="ctr"/>
-              <a:endParaRPr lang="pl-PL" sz="2700" dirty="0"/>
-            </a:p>
-          </p:txBody>
-        </p:sp>
-        <p:sp>
-          <p:nvSpPr>
-            <p:cNvPr id="7" name="Prostokąt zaokrąglony 6">
-              <a:extLst>
-                <a:ext uri="{FF2B5EF4-FFF2-40B4-BE49-F238E27FC236}">
-                  <a16:creationId xmlns:a16="http://schemas.microsoft.com/office/drawing/2014/main" id="{70481A10-AA50-B77F-DB8D-D77BA0489BAC}"/>
-                </a:ext>
-              </a:extLst>
-            </p:cNvPr>
-            <p:cNvSpPr/>
-            <p:nvPr/>
-          </p:nvSpPr>
-          <p:spPr>
-            <a:xfrm>
-              <a:off x="12790002" y="5100103"/>
-              <a:ext cx="5102060" cy="4733455"/>
-            </a:xfrm>
-            <a:prstGeom prst="roundRect">
-              <a:avLst>
-                <a:gd name="adj" fmla="val 3467"/>
-              </a:avLst>
-            </a:prstGeom>
-            <a:solidFill>
-              <a:srgbClr val="0C032A">
-                <a:alpha val="91024"/>
-              </a:srgbClr>
-            </a:solidFill>
-            <a:ln>
-              <a:noFill/>
-            </a:ln>
-            <a:effectLst/>
-          </p:spPr>
-          <p:style>
-            <a:lnRef idx="2">
-              <a:schemeClr val="accent1">
-                <a:shade val="15000"/>
-              </a:schemeClr>
-            </a:lnRef>
-            <a:fillRef idx="1">
-              <a:schemeClr val="accent1"/>
-            </a:fillRef>
-            <a:effectRef idx="0">
-              <a:schemeClr val="accent1"/>
-            </a:effectRef>
-            <a:fontRef idx="minor">
-              <a:schemeClr val="lt1"/>
-            </a:fontRef>
-          </p:style>
-          <p:txBody>
-            <a:bodyPr rtlCol="0" anchor="ctr"/>
-            <a:lstStyle/>
-            <a:p>
-              <a:pPr algn="ctr"/>
-              <a:endParaRPr lang="pl-PL" sz="2700" dirty="0"/>
-            </a:p>
-          </p:txBody>
-        </p:sp>
-        <p:sp>
-          <p:nvSpPr>
-            <p:cNvPr id="8" name="Prostokąt zaokrąglony 7">
-              <a:extLst>
-                <a:ext uri="{FF2B5EF4-FFF2-40B4-BE49-F238E27FC236}">
-                  <a16:creationId xmlns:a16="http://schemas.microsoft.com/office/drawing/2014/main" id="{69DFBB3D-3C59-0816-5E8F-A3AAB6C66C31}"/>
-                </a:ext>
-              </a:extLst>
-            </p:cNvPr>
-            <p:cNvSpPr/>
-            <p:nvPr/>
-          </p:nvSpPr>
-          <p:spPr>
-            <a:xfrm>
-              <a:off x="6809202" y="1764335"/>
-              <a:ext cx="4958850" cy="2519165"/>
-            </a:xfrm>
-            <a:prstGeom prst="roundRect">
-              <a:avLst>
-                <a:gd name="adj" fmla="val 12406"/>
-              </a:avLst>
-            </a:prstGeom>
-            <a:solidFill>
-              <a:srgbClr val="0C032A">
-                <a:alpha val="88198"/>
               </a:srgbClr>
             </a:solidFill>
             <a:ln>
@@ -7089,8 +6679,8 @@
           </p:nvSpPr>
           <p:spPr>
             <a:xfrm>
-              <a:off x="2995930" y="1756716"/>
-              <a:ext cx="2795269" cy="2547610"/>
+              <a:off x="2673859" y="1487973"/>
+              <a:ext cx="1603223" cy="3353941"/>
             </a:xfrm>
             <a:prstGeom prst="roundRect">
               <a:avLst>
@@ -7133,10 +6723,605 @@
           </p:txBody>
         </p:sp>
       </p:grpSp>
+      <p:cxnSp>
+        <p:nvCxnSpPr>
+          <p:cNvPr id="9" name="Łącznik prosty 8">
+            <a:extLst>
+              <a:ext uri="{FF2B5EF4-FFF2-40B4-BE49-F238E27FC236}">
+                <a16:creationId xmlns:a16="http://schemas.microsoft.com/office/drawing/2014/main" id="{E3C1C52A-C30D-DCFA-4249-2A60A57CE330}"/>
+              </a:ext>
+            </a:extLst>
+          </p:cNvPr>
+          <p:cNvCxnSpPr>
+            <a:cxnSpLocks/>
+          </p:cNvCxnSpPr>
+          <p:nvPr/>
+        </p:nvCxnSpPr>
+        <p:spPr>
+          <a:xfrm>
+            <a:off x="287743" y="3969124"/>
+            <a:ext cx="1971426" cy="0"/>
+          </a:xfrm>
+          <a:prstGeom prst="line">
+            <a:avLst/>
+          </a:prstGeom>
+          <a:ln>
+            <a:solidFill>
+              <a:schemeClr val="bg1"/>
+            </a:solidFill>
+          </a:ln>
+        </p:spPr>
+        <p:style>
+          <a:lnRef idx="1">
+            <a:schemeClr val="accent1"/>
+          </a:lnRef>
+          <a:fillRef idx="0">
+            <a:schemeClr val="accent1"/>
+          </a:fillRef>
+          <a:effectRef idx="0">
+            <a:schemeClr val="accent1"/>
+          </a:effectRef>
+          <a:fontRef idx="minor">
+            <a:schemeClr val="tx1"/>
+          </a:fontRef>
+        </p:style>
+      </p:cxnSp>
+      <p:cxnSp>
+        <p:nvCxnSpPr>
+          <p:cNvPr id="13" name="Łącznik prosty 12">
+            <a:extLst>
+              <a:ext uri="{FF2B5EF4-FFF2-40B4-BE49-F238E27FC236}">
+                <a16:creationId xmlns:a16="http://schemas.microsoft.com/office/drawing/2014/main" id="{74D33A2B-8541-4252-E9B2-B5CDF7FD5BED}"/>
+              </a:ext>
+            </a:extLst>
+          </p:cNvPr>
+          <p:cNvCxnSpPr>
+            <a:cxnSpLocks/>
+          </p:cNvCxnSpPr>
+          <p:nvPr/>
+        </p:nvCxnSpPr>
+        <p:spPr>
+          <a:xfrm>
+            <a:off x="212359" y="2092022"/>
+            <a:ext cx="1971425" cy="0"/>
+          </a:xfrm>
+          <a:prstGeom prst="line">
+            <a:avLst/>
+          </a:prstGeom>
+          <a:ln>
+            <a:solidFill>
+              <a:schemeClr val="bg1"/>
+            </a:solidFill>
+          </a:ln>
+        </p:spPr>
+        <p:style>
+          <a:lnRef idx="1">
+            <a:schemeClr val="accent1"/>
+          </a:lnRef>
+          <a:fillRef idx="0">
+            <a:schemeClr val="accent1"/>
+          </a:fillRef>
+          <a:effectRef idx="0">
+            <a:schemeClr val="accent1"/>
+          </a:effectRef>
+          <a:fontRef idx="minor">
+            <a:schemeClr val="tx1"/>
+          </a:fontRef>
+        </p:style>
+      </p:cxnSp>
+      <p:sp>
+        <p:nvSpPr>
+          <p:cNvPr id="20" name="pole tekstowe 19">
+            <a:extLst>
+              <a:ext uri="{FF2B5EF4-FFF2-40B4-BE49-F238E27FC236}">
+                <a16:creationId xmlns:a16="http://schemas.microsoft.com/office/drawing/2014/main" id="{B9B9E472-D82E-B351-9A49-13D314C463C8}"/>
+              </a:ext>
+            </a:extLst>
+          </p:cNvPr>
+          <p:cNvSpPr txBox="1"/>
+          <p:nvPr/>
+        </p:nvSpPr>
+        <p:spPr>
+          <a:xfrm>
+            <a:off x="116321" y="1649208"/>
+            <a:ext cx="2449637" cy="369332"/>
+          </a:xfrm>
+          <a:prstGeom prst="rect">
+            <a:avLst/>
+          </a:prstGeom>
+          <a:noFill/>
+        </p:spPr>
+        <p:txBody>
+          <a:bodyPr wrap="square">
+            <a:spAutoFit/>
+          </a:bodyPr>
+          <a:lstStyle/>
+          <a:p>
+            <a:r>
+              <a:rPr lang="pl-PL" spc="450" dirty="0">
+                <a:solidFill>
+                  <a:schemeClr val="bg1"/>
+                </a:solidFill>
+                <a:latin typeface="Open Sans Light" panose="020B0606030504020204" pitchFamily="34" charset="0"/>
+                <a:ea typeface="Open Sans Light" panose="020B0606030504020204" pitchFamily="34" charset="0"/>
+                <a:cs typeface="Open Sans Light" panose="020B0606030504020204" pitchFamily="34" charset="0"/>
+              </a:rPr>
+              <a:t>DEPARTMENTS</a:t>
+            </a:r>
+          </a:p>
+        </p:txBody>
+      </p:sp>
+      <p:sp>
+        <p:nvSpPr>
+          <p:cNvPr id="21" name="pole tekstowe 20">
+            <a:extLst>
+              <a:ext uri="{FF2B5EF4-FFF2-40B4-BE49-F238E27FC236}">
+                <a16:creationId xmlns:a16="http://schemas.microsoft.com/office/drawing/2014/main" id="{7FE6526F-59D4-2F2A-582E-B8735E3C653E}"/>
+              </a:ext>
+            </a:extLst>
+          </p:cNvPr>
+          <p:cNvSpPr txBox="1"/>
+          <p:nvPr/>
+        </p:nvSpPr>
+        <p:spPr>
+          <a:xfrm>
+            <a:off x="201423" y="3504707"/>
+            <a:ext cx="1566040" cy="369332"/>
+          </a:xfrm>
+          <a:prstGeom prst="rect">
+            <a:avLst/>
+          </a:prstGeom>
+          <a:noFill/>
+        </p:spPr>
+        <p:txBody>
+          <a:bodyPr wrap="square">
+            <a:spAutoFit/>
+          </a:bodyPr>
+          <a:lstStyle/>
+          <a:p>
+            <a:r>
+              <a:rPr lang="pl-PL" spc="450" dirty="0">
+                <a:solidFill>
+                  <a:schemeClr val="bg1"/>
+                </a:solidFill>
+                <a:latin typeface="Open Sans Light" panose="020B0606030504020204" pitchFamily="34" charset="0"/>
+                <a:ea typeface="Open Sans Light" panose="020B0606030504020204" pitchFamily="34" charset="0"/>
+                <a:cs typeface="Open Sans Light" panose="020B0606030504020204" pitchFamily="34" charset="0"/>
+              </a:rPr>
+              <a:t>TEAMS</a:t>
+            </a:r>
+            <a:endParaRPr lang="pl-PL" sz="1800" spc="450" dirty="0">
+              <a:solidFill>
+                <a:schemeClr val="bg1"/>
+              </a:solidFill>
+              <a:latin typeface="Open Sans Light" panose="020B0606030504020204" pitchFamily="34" charset="0"/>
+              <a:ea typeface="Open Sans Light" panose="020B0606030504020204" pitchFamily="34" charset="0"/>
+              <a:cs typeface="Open Sans Light" panose="020B0606030504020204" pitchFamily="34" charset="0"/>
+            </a:endParaRPr>
+          </a:p>
+        </p:txBody>
+      </p:sp>
+      <p:sp>
+        <p:nvSpPr>
+          <p:cNvPr id="22" name="Prostokąt zaokrąglony 21">
+            <a:extLst>
+              <a:ext uri="{FF2B5EF4-FFF2-40B4-BE49-F238E27FC236}">
+                <a16:creationId xmlns:a16="http://schemas.microsoft.com/office/drawing/2014/main" id="{2D78CEB0-ED93-1063-8EE0-63AD97C20AA0}"/>
+              </a:ext>
+            </a:extLst>
+          </p:cNvPr>
+          <p:cNvSpPr/>
+          <p:nvPr/>
+        </p:nvSpPr>
+        <p:spPr>
+          <a:xfrm>
+            <a:off x="8729274" y="1515689"/>
+            <a:ext cx="2892588" cy="1492733"/>
+          </a:xfrm>
+          <a:prstGeom prst="roundRect">
+            <a:avLst>
+              <a:gd name="adj" fmla="val 12406"/>
+            </a:avLst>
+          </a:prstGeom>
+          <a:solidFill>
+            <a:srgbClr val="0C032A">
+              <a:alpha val="66000"/>
+            </a:srgbClr>
+          </a:solidFill>
+          <a:ln>
+            <a:noFill/>
+          </a:ln>
+          <a:effectLst>
+            <a:outerShdw blurRad="167363" dist="38100" dir="7800000" sx="104116" sy="104116" algn="tl" rotWithShape="0">
+              <a:schemeClr val="bg1">
+                <a:alpha val="87452"/>
+              </a:schemeClr>
+            </a:outerShdw>
+          </a:effectLst>
+        </p:spPr>
+        <p:style>
+          <a:lnRef idx="2">
+            <a:schemeClr val="accent1">
+              <a:shade val="15000"/>
+            </a:schemeClr>
+          </a:lnRef>
+          <a:fillRef idx="1">
+            <a:schemeClr val="accent1"/>
+          </a:fillRef>
+          <a:effectRef idx="0">
+            <a:schemeClr val="accent1"/>
+          </a:effectRef>
+          <a:fontRef idx="minor">
+            <a:schemeClr val="lt1"/>
+          </a:fontRef>
+        </p:style>
+        <p:txBody>
+          <a:bodyPr rtlCol="0" anchor="ctr"/>
+          <a:lstStyle/>
+          <a:p>
+            <a:pPr algn="ctr"/>
+            <a:endParaRPr lang="pl-PL" sz="2700" dirty="0"/>
+          </a:p>
+        </p:txBody>
+      </p:sp>
+      <p:sp>
+        <p:nvSpPr>
+          <p:cNvPr id="23" name="Prostokąt zaokrąglony 22">
+            <a:extLst>
+              <a:ext uri="{FF2B5EF4-FFF2-40B4-BE49-F238E27FC236}">
+                <a16:creationId xmlns:a16="http://schemas.microsoft.com/office/drawing/2014/main" id="{BFC5DC4E-7C16-2E41-BFBD-F4E2FC1AA81A}"/>
+              </a:ext>
+            </a:extLst>
+          </p:cNvPr>
+          <p:cNvSpPr/>
+          <p:nvPr/>
+        </p:nvSpPr>
+        <p:spPr>
+          <a:xfrm>
+            <a:off x="8729274" y="3374068"/>
+            <a:ext cx="2892588" cy="1492733"/>
+          </a:xfrm>
+          <a:prstGeom prst="roundRect">
+            <a:avLst>
+              <a:gd name="adj" fmla="val 12406"/>
+            </a:avLst>
+          </a:prstGeom>
+          <a:solidFill>
+            <a:srgbClr val="0C032A">
+              <a:alpha val="66000"/>
+            </a:srgbClr>
+          </a:solidFill>
+          <a:ln>
+            <a:noFill/>
+          </a:ln>
+          <a:effectLst>
+            <a:outerShdw blurRad="167363" dist="38100" dir="7800000" sx="104116" sy="104116" algn="tl" rotWithShape="0">
+              <a:schemeClr val="bg1">
+                <a:alpha val="87452"/>
+              </a:schemeClr>
+            </a:outerShdw>
+          </a:effectLst>
+        </p:spPr>
+        <p:style>
+          <a:lnRef idx="2">
+            <a:schemeClr val="accent1">
+              <a:shade val="15000"/>
+            </a:schemeClr>
+          </a:lnRef>
+          <a:fillRef idx="1">
+            <a:schemeClr val="accent1"/>
+          </a:fillRef>
+          <a:effectRef idx="0">
+            <a:schemeClr val="accent1"/>
+          </a:effectRef>
+          <a:fontRef idx="minor">
+            <a:schemeClr val="lt1"/>
+          </a:fontRef>
+        </p:style>
+        <p:txBody>
+          <a:bodyPr rtlCol="0" anchor="ctr"/>
+          <a:lstStyle/>
+          <a:p>
+            <a:pPr algn="ctr"/>
+            <a:endParaRPr lang="pl-PL" sz="2700" dirty="0"/>
+          </a:p>
+        </p:txBody>
+      </p:sp>
+      <p:sp>
+        <p:nvSpPr>
+          <p:cNvPr id="24" name="Prostokąt zaokrąglony 23">
+            <a:extLst>
+              <a:ext uri="{FF2B5EF4-FFF2-40B4-BE49-F238E27FC236}">
+                <a16:creationId xmlns:a16="http://schemas.microsoft.com/office/drawing/2014/main" id="{D43B5157-0892-9E00-7680-62FA4C2949B3}"/>
+              </a:ext>
+            </a:extLst>
+          </p:cNvPr>
+          <p:cNvSpPr/>
+          <p:nvPr/>
+        </p:nvSpPr>
+        <p:spPr>
+          <a:xfrm>
+            <a:off x="5289166" y="3374068"/>
+            <a:ext cx="2892588" cy="1492733"/>
+          </a:xfrm>
+          <a:prstGeom prst="roundRect">
+            <a:avLst>
+              <a:gd name="adj" fmla="val 12406"/>
+            </a:avLst>
+          </a:prstGeom>
+          <a:solidFill>
+            <a:srgbClr val="0C032A">
+              <a:alpha val="66000"/>
+            </a:srgbClr>
+          </a:solidFill>
+          <a:ln>
+            <a:noFill/>
+          </a:ln>
+          <a:effectLst>
+            <a:outerShdw blurRad="167363" dist="38100" dir="7800000" sx="104116" sy="104116" algn="tl" rotWithShape="0">
+              <a:schemeClr val="bg1">
+                <a:alpha val="87452"/>
+              </a:schemeClr>
+            </a:outerShdw>
+          </a:effectLst>
+        </p:spPr>
+        <p:style>
+          <a:lnRef idx="2">
+            <a:schemeClr val="accent1">
+              <a:shade val="15000"/>
+            </a:schemeClr>
+          </a:lnRef>
+          <a:fillRef idx="1">
+            <a:schemeClr val="accent1"/>
+          </a:fillRef>
+          <a:effectRef idx="0">
+            <a:schemeClr val="accent1"/>
+          </a:effectRef>
+          <a:fontRef idx="minor">
+            <a:schemeClr val="lt1"/>
+          </a:fontRef>
+        </p:style>
+        <p:txBody>
+          <a:bodyPr rtlCol="0" anchor="ctr"/>
+          <a:lstStyle/>
+          <a:p>
+            <a:pPr algn="ctr"/>
+            <a:endParaRPr lang="pl-PL" sz="2700" dirty="0"/>
+          </a:p>
+        </p:txBody>
+      </p:sp>
+      <p:sp>
+        <p:nvSpPr>
+          <p:cNvPr id="25" name="Prostokąt zaokrąglony 24">
+            <a:extLst>
+              <a:ext uri="{FF2B5EF4-FFF2-40B4-BE49-F238E27FC236}">
+                <a16:creationId xmlns:a16="http://schemas.microsoft.com/office/drawing/2014/main" id="{70FB2059-E9D8-DC76-69D9-A14B5886E3EC}"/>
+              </a:ext>
+            </a:extLst>
+          </p:cNvPr>
+          <p:cNvSpPr/>
+          <p:nvPr/>
+        </p:nvSpPr>
+        <p:spPr>
+          <a:xfrm>
+            <a:off x="5289167" y="1511883"/>
+            <a:ext cx="2902118" cy="1496540"/>
+          </a:xfrm>
+          <a:prstGeom prst="roundRect">
+            <a:avLst>
+              <a:gd name="adj" fmla="val 12406"/>
+            </a:avLst>
+          </a:prstGeom>
+          <a:solidFill>
+            <a:srgbClr val="0C032A">
+              <a:alpha val="88198"/>
+            </a:srgbClr>
+          </a:solidFill>
+          <a:ln>
+            <a:noFill/>
+          </a:ln>
+          <a:effectLst/>
+        </p:spPr>
+        <p:style>
+          <a:lnRef idx="2">
+            <a:schemeClr val="accent1">
+              <a:shade val="15000"/>
+            </a:schemeClr>
+          </a:lnRef>
+          <a:fillRef idx="1">
+            <a:schemeClr val="accent1"/>
+          </a:fillRef>
+          <a:effectRef idx="0">
+            <a:schemeClr val="accent1"/>
+          </a:effectRef>
+          <a:fontRef idx="minor">
+            <a:schemeClr val="lt1"/>
+          </a:fontRef>
+        </p:style>
+        <p:txBody>
+          <a:bodyPr rtlCol="0" anchor="ctr"/>
+          <a:lstStyle/>
+          <a:p>
+            <a:pPr algn="ctr"/>
+            <a:endParaRPr lang="pl-PL" sz="2700" dirty="0"/>
+          </a:p>
+        </p:txBody>
+      </p:sp>
+      <p:sp>
+        <p:nvSpPr>
+          <p:cNvPr id="26" name="Prostokąt zaokrąglony 25">
+            <a:extLst>
+              <a:ext uri="{FF2B5EF4-FFF2-40B4-BE49-F238E27FC236}">
+                <a16:creationId xmlns:a16="http://schemas.microsoft.com/office/drawing/2014/main" id="{830FEE58-FCA0-95E3-95D3-309C49D8E2B8}"/>
+              </a:ext>
+            </a:extLst>
+          </p:cNvPr>
+          <p:cNvSpPr/>
+          <p:nvPr/>
+        </p:nvSpPr>
+        <p:spPr>
+          <a:xfrm>
+            <a:off x="8739138" y="1521013"/>
+            <a:ext cx="2882724" cy="1487409"/>
+          </a:xfrm>
+          <a:prstGeom prst="roundRect">
+            <a:avLst>
+              <a:gd name="adj" fmla="val 12406"/>
+            </a:avLst>
+          </a:prstGeom>
+          <a:solidFill>
+            <a:srgbClr val="0C032A">
+              <a:alpha val="88198"/>
+            </a:srgbClr>
+          </a:solidFill>
+          <a:ln>
+            <a:noFill/>
+          </a:ln>
+          <a:effectLst/>
+        </p:spPr>
+        <p:style>
+          <a:lnRef idx="2">
+            <a:schemeClr val="accent1">
+              <a:shade val="15000"/>
+            </a:schemeClr>
+          </a:lnRef>
+          <a:fillRef idx="1">
+            <a:schemeClr val="accent1"/>
+          </a:fillRef>
+          <a:effectRef idx="0">
+            <a:schemeClr val="accent1"/>
+          </a:effectRef>
+          <a:fontRef idx="minor">
+            <a:schemeClr val="lt1"/>
+          </a:fontRef>
+        </p:style>
+        <p:txBody>
+          <a:bodyPr rtlCol="0" anchor="ctr"/>
+          <a:lstStyle/>
+          <a:p>
+            <a:pPr algn="ctr"/>
+            <a:endParaRPr lang="pl-PL" sz="2700" dirty="0"/>
+          </a:p>
+        </p:txBody>
+      </p:sp>
+      <p:sp>
+        <p:nvSpPr>
+          <p:cNvPr id="27" name="Prostokąt zaokrąglony 26">
+            <a:extLst>
+              <a:ext uri="{FF2B5EF4-FFF2-40B4-BE49-F238E27FC236}">
+                <a16:creationId xmlns:a16="http://schemas.microsoft.com/office/drawing/2014/main" id="{56963496-990B-3AB8-35A6-754744F815E3}"/>
+              </a:ext>
+            </a:extLst>
+          </p:cNvPr>
+          <p:cNvSpPr/>
+          <p:nvPr/>
+        </p:nvSpPr>
+        <p:spPr>
+          <a:xfrm>
+            <a:off x="5289167" y="3374069"/>
+            <a:ext cx="2892588" cy="1491755"/>
+          </a:xfrm>
+          <a:prstGeom prst="roundRect">
+            <a:avLst>
+              <a:gd name="adj" fmla="val 12406"/>
+            </a:avLst>
+          </a:prstGeom>
+          <a:solidFill>
+            <a:srgbClr val="0C032A">
+              <a:alpha val="88198"/>
+            </a:srgbClr>
+          </a:solidFill>
+          <a:ln>
+            <a:noFill/>
+          </a:ln>
+          <a:effectLst/>
+        </p:spPr>
+        <p:style>
+          <a:lnRef idx="2">
+            <a:schemeClr val="accent1">
+              <a:shade val="15000"/>
+            </a:schemeClr>
+          </a:lnRef>
+          <a:fillRef idx="1">
+            <a:schemeClr val="accent1"/>
+          </a:fillRef>
+          <a:effectRef idx="0">
+            <a:schemeClr val="accent1"/>
+          </a:effectRef>
+          <a:fontRef idx="minor">
+            <a:schemeClr val="lt1"/>
+          </a:fontRef>
+        </p:style>
+        <p:txBody>
+          <a:bodyPr rtlCol="0" anchor="ctr"/>
+          <a:lstStyle/>
+          <a:p>
+            <a:pPr algn="ctr"/>
+            <a:endParaRPr lang="pl-PL" sz="2700" dirty="0"/>
+          </a:p>
+        </p:txBody>
+      </p:sp>
+      <p:sp>
+        <p:nvSpPr>
+          <p:cNvPr id="28" name="Prostokąt zaokrąglony 27">
+            <a:extLst>
+              <a:ext uri="{FF2B5EF4-FFF2-40B4-BE49-F238E27FC236}">
+                <a16:creationId xmlns:a16="http://schemas.microsoft.com/office/drawing/2014/main" id="{435AD8D0-2882-A8B5-1988-58840F143EAC}"/>
+              </a:ext>
+            </a:extLst>
+          </p:cNvPr>
+          <p:cNvSpPr/>
+          <p:nvPr/>
+        </p:nvSpPr>
+        <p:spPr>
+          <a:xfrm>
+            <a:off x="8739139" y="3373094"/>
+            <a:ext cx="2902119" cy="1492733"/>
+          </a:xfrm>
+          <a:prstGeom prst="roundRect">
+            <a:avLst>
+              <a:gd name="adj" fmla="val 12406"/>
+            </a:avLst>
+          </a:prstGeom>
+          <a:solidFill>
+            <a:srgbClr val="0C032A">
+              <a:alpha val="88198"/>
+            </a:srgbClr>
+          </a:solidFill>
+          <a:ln>
+            <a:noFill/>
+          </a:ln>
+          <a:effectLst/>
+        </p:spPr>
+        <p:style>
+          <a:lnRef idx="2">
+            <a:schemeClr val="accent1">
+              <a:shade val="15000"/>
+            </a:schemeClr>
+          </a:lnRef>
+          <a:fillRef idx="1">
+            <a:schemeClr val="accent1"/>
+          </a:fillRef>
+          <a:effectRef idx="0">
+            <a:schemeClr val="accent1"/>
+          </a:effectRef>
+          <a:fontRef idx="minor">
+            <a:schemeClr val="lt1"/>
+          </a:fontRef>
+        </p:style>
+        <p:txBody>
+          <a:bodyPr rtlCol="0" anchor="ctr"/>
+          <a:lstStyle/>
+          <a:p>
+            <a:pPr algn="ctr"/>
+            <a:endParaRPr lang="pl-PL" sz="2700" dirty="0"/>
+          </a:p>
+        </p:txBody>
+      </p:sp>
     </p:spTree>
     <p:extLst>
       <p:ext uri="{BB962C8B-B14F-4D97-AF65-F5344CB8AC3E}">
-        <p14:creationId xmlns:p14="http://schemas.microsoft.com/office/powerpoint/2010/main" val="3477967936"/>
+        <p14:creationId xmlns:p14="http://schemas.microsoft.com/office/powerpoint/2010/main" val="4003577474"/>
       </p:ext>
     </p:extLst>
   </p:cSld>

</xml_diff>